<commit_message>
add Live-Ticker, update Folien
</commit_message>
<xml_diff>
--- a/Folien.pptx
+++ b/Folien.pptx
@@ -7592,15 +7592,16 @@
             <a:pPr lvl="2"/>
             <a:r>
               <a:rPr lang="de-DE" dirty="0" smtClean="0"/>
+              <a:t>Live-Ticker</a:t>
+            </a:r>
+          </a:p>
+          <a:p>
+            <a:pPr lvl="2"/>
+            <a:r>
+              <a:rPr lang="de-DE" dirty="0" smtClean="0"/>
               <a:t>Fernsteuerung</a:t>
             </a:r>
-          </a:p>
-          <a:p>
-            <a:pPr lvl="2"/>
-            <a:r>
-              <a:rPr lang="de-DE" dirty="0" smtClean="0"/>
-              <a:t>Samstagsmaler</a:t>
-            </a:r>
+            <a:endParaRPr lang="de-DE" dirty="0" smtClean="0"/>
           </a:p>
           <a:p>
             <a:pPr lvl="1"/>
@@ -20207,15 +20208,16 @@
             <a:pPr lvl="2"/>
             <a:r>
               <a:rPr lang="de-DE" dirty="0" smtClean="0"/>
+              <a:t>Live-Ticker</a:t>
+            </a:r>
+          </a:p>
+          <a:p>
+            <a:pPr lvl="2"/>
+            <a:r>
+              <a:rPr lang="de-DE" dirty="0" smtClean="0"/>
               <a:t>Fernsteuerung</a:t>
             </a:r>
-          </a:p>
-          <a:p>
-            <a:pPr lvl="2"/>
-            <a:r>
-              <a:rPr lang="de-DE" dirty="0" smtClean="0"/>
-              <a:t>Samstagsmaler</a:t>
-            </a:r>
+            <a:endParaRPr lang="de-DE" dirty="0" smtClean="0"/>
           </a:p>
           <a:p>
             <a:pPr lvl="1"/>
@@ -25157,15 +25159,24 @@
             <a:pPr lvl="2"/>
             <a:r>
               <a:rPr lang="de-DE" b="1" dirty="0" smtClean="0"/>
+              <a:t>Live</a:t>
+            </a:r>
+            <a:r>
+              <a:rPr lang="de-DE" b="1" smtClean="0"/>
+              <a:t>-Ticker</a:t>
+            </a:r>
+          </a:p>
+          <a:p>
+            <a:pPr lvl="2"/>
+            <a:r>
+              <a:rPr lang="de-DE" b="1" dirty="0" smtClean="0"/>
               <a:t>Fernsteuerung</a:t>
             </a:r>
+            <a:endParaRPr lang="de-DE" b="1" dirty="0" smtClean="0"/>
           </a:p>
           <a:p>
             <a:pPr lvl="2"/>
-            <a:r>
-              <a:rPr lang="de-DE" b="1" dirty="0" smtClean="0"/>
-              <a:t>Samstagsmaler</a:t>
-            </a:r>
+            <a:endParaRPr lang="de-DE" b="1" dirty="0" smtClean="0"/>
           </a:p>
           <a:p>
             <a:pPr lvl="1"/>
@@ -28674,15 +28685,20 @@
             <a:pPr lvl="2"/>
             <a:r>
               <a:rPr lang="de-DE" dirty="0" smtClean="0"/>
+              <a:t>Live-Ticker</a:t>
+            </a:r>
+          </a:p>
+          <a:p>
+            <a:pPr lvl="2"/>
+            <a:r>
+              <a:rPr lang="de-DE" dirty="0" smtClean="0"/>
               <a:t>Fernsteuerung</a:t>
             </a:r>
+            <a:endParaRPr lang="de-DE" dirty="0" smtClean="0"/>
           </a:p>
           <a:p>
             <a:pPr lvl="2"/>
-            <a:r>
-              <a:rPr lang="de-DE" dirty="0" smtClean="0"/>
-              <a:t>Samstagsmaler</a:t>
-            </a:r>
+            <a:endParaRPr lang="de-DE" dirty="0" smtClean="0"/>
           </a:p>
           <a:p>
             <a:pPr lvl="1"/>

</xml_diff>